<commit_message>
scooted just the tiniest lil thing
</commit_message>
<xml_diff>
--- a/MOTE/MOTE Poster.pptx
+++ b/MOTE/MOTE Poster.pptx
@@ -15,13 +15,13 @@
   <p:notesSz cx="6858000" cy="9144000"/>
   <p:embeddedFontLst>
     <p:embeddedFont>
-      <p:font typeface="Abril Fatface" panose="020B0604020202020204" charset="0"/>
+      <p:font typeface="Arial Black" panose="020B0A04020102020204" pitchFamily="34" charset="0"/>
       <p:regular r:id="rId5"/>
+      <p:bold r:id="rId6"/>
     </p:embeddedFont>
     <p:embeddedFont>
-      <p:font typeface="Arial Black" panose="020B0A04020102020204" pitchFamily="34" charset="0"/>
-      <p:regular r:id="rId6"/>
-      <p:bold r:id="rId7"/>
+      <p:font typeface="Abril Fatface" panose="020B0604020202020204" charset="0"/>
+      <p:regular r:id="rId7"/>
     </p:embeddedFont>
     <p:embeddedFont>
       <p:font typeface="Calibri" panose="020F0502020204030204" pitchFamily="34" charset="0"/>
@@ -260,6 +260,11 @@
       </a:defRPr>
     </a:lvl9pPr>
   </p:defaultTextStyle>
+  <p:extLst>
+    <p:ext uri="{EFAFB233-063F-42B5-8137-9DF3F51BA10A}">
+      <p15:sldGuideLst xmlns:p15="http://schemas.microsoft.com/office/powerpoint/2012/main"/>
+    </p:ext>
+  </p:extLst>
 </p:presentation>
 </file>
 
@@ -20527,7 +20532,7 @@
               <a:buNone/>
             </a:pPr>
             <a:r>
-              <a:rPr lang="en" sz="3200">
+              <a:rPr lang="en" sz="3200" dirty="0">
                 <a:latin typeface="Times New Roman"/>
                 <a:ea typeface="Times New Roman"/>
                 <a:cs typeface="Times New Roman"/>
@@ -20535,7 +20540,7 @@
               </a:rPr>
               <a:t>After the user inputs their data, the summary page provides everything the user needs to interpret the statistics. This includes a definition of the test, the appropriate effect size measure, confidence interval of the effect size, summary, and test statistics with interpretations of all these values.  </a:t>
             </a:r>
-            <a:endParaRPr sz="3200">
+            <a:endParaRPr sz="3200" dirty="0">
               <a:latin typeface="Times New Roman"/>
               <a:ea typeface="Times New Roman"/>
               <a:cs typeface="Times New Roman"/>
@@ -21582,7 +21587,7 @@
         </p:nvSpPr>
         <p:spPr>
           <a:xfrm>
-            <a:off x="15254888" y="29771163"/>
+            <a:off x="15309075" y="29560169"/>
             <a:ext cx="13410600" cy="2709112"/>
           </a:xfrm>
           <a:prstGeom prst="rect">
@@ -21765,7 +21770,7 @@
               <a:t>StatsTools</a:t>
             </a:r>
             <a:r>
-              <a:rPr lang="en-US" sz="3000">
+              <a:rPr lang="en-US" sz="3000" dirty="0">
                 <a:solidFill>
                   <a:schemeClr val="dk1"/>
                 </a:solidFill>
@@ -21777,7 +21782,7 @@
               <a:t> at: </a:t>
             </a:r>
             <a:r>
-              <a:rPr lang="en-US" sz="3000">
+              <a:rPr lang="en-US" sz="3000" dirty="0">
                 <a:solidFill>
                   <a:schemeClr val="dk1"/>
                 </a:solidFill>
@@ -21790,7 +21795,7 @@
               <a:t>http://statstools.com/</a:t>
             </a:r>
             <a:r>
-              <a:rPr lang="en-US" sz="3000">
+              <a:rPr lang="en-US" sz="3000" dirty="0">
                 <a:solidFill>
                   <a:schemeClr val="dk1"/>
                 </a:solidFill>

</xml_diff>

<commit_message>
last one didn't work
</commit_message>
<xml_diff>
--- a/MOTE/MOTE Poster.pptx
+++ b/MOTE/MOTE Poster.pptx
@@ -19764,8 +19764,8 @@
         </p:nvSpPr>
         <p:spPr>
           <a:xfrm>
-            <a:off x="526350" y="3809875"/>
-            <a:ext cx="42823500" cy="5119200"/>
+            <a:off x="526350" y="3851439"/>
+            <a:ext cx="42823500" cy="5280894"/>
           </a:xfrm>
           <a:prstGeom prst="rect">
             <a:avLst/>

</xml_diff>